<commit_message>
fixed images proportion slide casi particolari 3
</commit_message>
<xml_diff>
--- a/Presentazione MAS/Presentazione MAS.pptx
+++ b/Presentazione MAS/Presentazione MAS.pptx
@@ -8449,8 +8449,8 @@
         </p:blipFill>
         <p:spPr>
           <a:xfrm>
-            <a:off x="1729301" y="2844298"/>
-            <a:ext cx="3109645" cy="3188704"/>
+            <a:off x="1593437" y="2852936"/>
+            <a:ext cx="3348848" cy="3433989"/>
           </a:xfrm>
           <a:prstGeom prst="rect">
             <a:avLst/>
@@ -8479,8 +8479,8 @@
         </p:blipFill>
         <p:spPr>
           <a:xfrm>
-            <a:off x="5569468" y="3379717"/>
-            <a:ext cx="5817746" cy="2117864"/>
+            <a:off x="5230317" y="3374047"/>
+            <a:ext cx="6480720" cy="2359209"/>
           </a:xfrm>
           <a:prstGeom prst="rect">
             <a:avLst/>

</xml_diff>

<commit_message>
Changed titles, done some adjustments.
</commit_message>
<xml_diff>
--- a/Presentazione MAS/Presentazione MAS.pptx
+++ b/Presentazione MAS/Presentazione MAS.pptx
@@ -244,7 +244,7 @@
             <a:pPr rtl="0"/>
             <a:fld id="{23AEF8A9-CFB5-40C0-BAE2-5B4633EC9F63}" type="datetime1">
               <a:rPr lang="it-IT" smtClean="0"/>
-              <a:t>18/09/2018</a:t>
+              <a:t>19/09/2018</a:t>
             </a:fld>
             <a:endParaRPr lang="it-IT" dirty="0"/>
           </a:p>
@@ -421,7 +421,7 @@
             <a:fld id="{09F431D3-F76B-41A6-8072-4F6D884C46F8}" type="datetime1">
               <a:rPr lang="it-IT" smtClean="0"/>
               <a:pPr/>
-              <a:t>18/09/2018</a:t>
+              <a:t>19/09/2018</a:t>
             </a:fld>
             <a:endParaRPr lang="it-IT" dirty="0"/>
           </a:p>
@@ -2068,7 +2068,7 @@
           <a:p>
             <a:fld id="{FE00C66D-72EC-4F55-BEC8-500A85C081B3}" type="datetime1">
               <a:rPr lang="it-IT" smtClean="0"/>
-              <a:t>18/09/2018</a:t>
+              <a:t>19/09/2018</a:t>
             </a:fld>
             <a:endParaRPr lang="it-IT" dirty="0"/>
           </a:p>
@@ -2341,7 +2341,7 @@
           <a:p>
             <a:fld id="{179FDD90-8460-47A7-A040-CF9AB50248A0}" type="datetime1">
               <a:rPr lang="it-IT" smtClean="0"/>
-              <a:t>18/09/2018</a:t>
+              <a:t>19/09/2018</a:t>
             </a:fld>
             <a:endParaRPr lang="it-IT" dirty="0"/>
           </a:p>
@@ -3168,7 +3168,7 @@
           <a:p>
             <a:fld id="{C35C6EAA-EB31-44A8-9C8F-5624F8F22B6E}" type="datetime1">
               <a:rPr lang="it-IT" smtClean="0"/>
-              <a:t>18/09/2018</a:t>
+              <a:t>19/09/2018</a:t>
             </a:fld>
             <a:endParaRPr lang="it-IT" dirty="0"/>
           </a:p>
@@ -4617,7 +4617,7 @@
           <a:p>
             <a:fld id="{508B2D1E-DF59-4334-A58E-8DEAA289E0E3}" type="datetime1">
               <a:rPr lang="it-IT" smtClean="0"/>
-              <a:t>18/09/2018</a:t>
+              <a:t>19/09/2018</a:t>
             </a:fld>
             <a:endParaRPr lang="it-IT" dirty="0"/>
           </a:p>
@@ -4950,7 +4950,7 @@
           <a:p>
             <a:fld id="{A34FAF5A-4D19-43B1-A45D-8D72A2F8F704}" type="datetime1">
               <a:rPr lang="it-IT" smtClean="0"/>
-              <a:t>18/09/2018</a:t>
+              <a:t>19/09/2018</a:t>
             </a:fld>
             <a:endParaRPr lang="it-IT" dirty="0"/>
           </a:p>
@@ -5409,7 +5409,7 @@
           <a:p>
             <a:fld id="{67C3AB17-3636-4D0B-9DE8-A264915F3F2F}" type="datetime1">
               <a:rPr lang="it-IT" smtClean="0"/>
-              <a:t>18/09/2018</a:t>
+              <a:t>19/09/2018</a:t>
             </a:fld>
             <a:endParaRPr lang="it-IT" dirty="0"/>
           </a:p>
@@ -5550,7 +5550,7 @@
           <a:p>
             <a:fld id="{48D20E2B-0105-405D-B96A-D58D2B631809}" type="datetime1">
               <a:rPr lang="it-IT" smtClean="0"/>
-              <a:t>18/09/2018</a:t>
+              <a:t>19/09/2018</a:t>
             </a:fld>
             <a:endParaRPr lang="it-IT" dirty="0"/>
           </a:p>
@@ -5895,7 +5895,7 @@
           <a:p>
             <a:fld id="{784E50A8-D6B4-4E55-B346-C613EC2AD65E}" type="datetime1">
               <a:rPr lang="it-IT" smtClean="0"/>
-              <a:t>18/09/2018</a:t>
+              <a:t>19/09/2018</a:t>
             </a:fld>
             <a:endParaRPr lang="it-IT" dirty="0"/>
           </a:p>
@@ -6398,7 +6398,7 @@
           <a:p>
             <a:fld id="{FBEB48ED-4E8D-4666-ADC1-9C8D79C0B922}" type="datetime1">
               <a:rPr lang="it-IT" smtClean="0"/>
-              <a:t>18/09/2018</a:t>
+              <a:t>19/09/2018</a:t>
             </a:fld>
             <a:endParaRPr lang="it-IT" dirty="0"/>
           </a:p>
@@ -6854,7 +6854,7 @@
           <a:p>
             <a:fld id="{365EC329-2963-4C84-96E5-2A1FA59F8646}" type="datetime1">
               <a:rPr lang="it-IT" smtClean="0"/>
-              <a:t>18/09/2018</a:t>
+              <a:t>19/09/2018</a:t>
             </a:fld>
             <a:endParaRPr lang="it-IT" dirty="0"/>
           </a:p>
@@ -7432,7 +7432,7 @@
           <a:p>
             <a:fld id="{99CE1268-C6CD-45A8-AABD-978440FDBD0C}" type="datetime1">
               <a:rPr lang="it-IT" smtClean="0"/>
-              <a:t>18/09/2018</a:t>
+              <a:t>19/09/2018</a:t>
             </a:fld>
             <a:endParaRPr lang="it-IT" dirty="0"/>
           </a:p>
@@ -8106,7 +8106,7 @@
           <a:p>
             <a:r>
               <a:rPr lang="it-IT" dirty="0"/>
-              <a:t>Casi interessanti - 1</a:t>
+              <a:t>Casi Interessanti - 1</a:t>
             </a:r>
           </a:p>
         </p:txBody>
@@ -8264,7 +8264,7 @@
           <a:p>
             <a:r>
               <a:rPr lang="it-IT" dirty="0"/>
-              <a:t>Casi interessanti - 2</a:t>
+              <a:t>Casi Interessanti - 2</a:t>
             </a:r>
           </a:p>
         </p:txBody>
@@ -8422,7 +8422,7 @@
           <a:p>
             <a:r>
               <a:rPr lang="it-IT" dirty="0"/>
-              <a:t>Casi interessanti - 3</a:t>
+              <a:t>Casi Interessanti - 3</a:t>
             </a:r>
           </a:p>
         </p:txBody>
@@ -8449,8 +8449,8 @@
         </p:blipFill>
         <p:spPr>
           <a:xfrm>
-            <a:off x="1593437" y="2852936"/>
-            <a:ext cx="3348848" cy="3433989"/>
+            <a:off x="1729301" y="2844298"/>
+            <a:ext cx="3109645" cy="3188704"/>
           </a:xfrm>
           <a:prstGeom prst="rect">
             <a:avLst/>
@@ -8479,8 +8479,8 @@
         </p:blipFill>
         <p:spPr>
           <a:xfrm>
-            <a:off x="5230317" y="3374047"/>
-            <a:ext cx="6480720" cy="2359209"/>
+            <a:off x="5569468" y="3379717"/>
+            <a:ext cx="5817746" cy="2117864"/>
           </a:xfrm>
           <a:prstGeom prst="rect">
             <a:avLst/>
@@ -8552,7 +8552,7 @@
             <a:pPr rtl="0"/>
             <a:r>
               <a:rPr lang="it-IT" dirty="0"/>
-              <a:t>Problematiche evidenziate</a:t>
+              <a:t>Problematiche Evidenziate</a:t>
             </a:r>
           </a:p>
         </p:txBody>
@@ -8680,6 +8680,10 @@
           <a:lstStyle/>
           <a:p>
             <a:pPr rtl="0"/>
+            <a:endParaRPr lang="it-IT" dirty="0"/>
+          </a:p>
+          <a:p>
+            <a:pPr rtl="0"/>
             <a:r>
               <a:rPr lang="it-IT" dirty="0"/>
               <a:t>Creazione di un sistema ad agenti per il tracking di target mobili in ambiente chiuso</a:t>
@@ -8807,8 +8811,8 @@
         </p:blipFill>
         <p:spPr bwMode="auto">
           <a:xfrm flipH="1">
-            <a:off x="1773932" y="4185084"/>
-            <a:ext cx="1836680" cy="1836680"/>
+            <a:off x="1773932" y="4076121"/>
+            <a:ext cx="1729143" cy="1729143"/>
           </a:xfrm>
           <a:prstGeom prst="rect">
             <a:avLst/>
@@ -8854,8 +8858,8 @@
         </p:blipFill>
         <p:spPr bwMode="auto">
           <a:xfrm>
-            <a:off x="1485900" y="1719910"/>
-            <a:ext cx="1836680" cy="1955052"/>
+            <a:off x="1593436" y="1834376"/>
+            <a:ext cx="1729144" cy="1840585"/>
           </a:xfrm>
           <a:prstGeom prst="rect">
             <a:avLst/>
@@ -9128,7 +9132,7 @@
             <a:pPr rtl="0"/>
             <a:r>
               <a:rPr lang="it-IT" dirty="0"/>
-              <a:t>L’interfaccia </a:t>
+              <a:t>Interfaccia Grafica </a:t>
             </a:r>
           </a:p>
         </p:txBody>
@@ -9278,7 +9282,7 @@
             <a:pPr rtl="0"/>
             <a:r>
               <a:rPr lang="it-IT" dirty="0"/>
-              <a:t>La Console di Output</a:t>
+              <a:t>Console di Output</a:t>
             </a:r>
           </a:p>
         </p:txBody>
@@ -9415,7 +9419,7 @@
             <a:pPr rtl="0"/>
             <a:r>
               <a:rPr lang="it-IT" dirty="0"/>
-              <a:t>Passaggio dei target tra agenti</a:t>
+              <a:t>Passaggio dei Target tra Agenti</a:t>
             </a:r>
           </a:p>
         </p:txBody>
@@ -9552,7 +9556,15 @@
             <a:pPr rtl="0"/>
             <a:r>
               <a:rPr lang="it-IT" dirty="0"/>
-              <a:t>Passaggio dei target tra agenti</a:t>
+              <a:t>Funzione ‘</a:t>
+            </a:r>
+            <a:r>
+              <a:rPr lang="it-IT" dirty="0" err="1"/>
+              <a:t>bid</a:t>
+            </a:r>
+            <a:r>
+              <a:rPr lang="it-IT" dirty="0"/>
+              <a:t>’</a:t>
             </a:r>
           </a:p>
         </p:txBody>
@@ -10087,7 +10099,7 @@
                   <a:prstClr val="black"/>
                 </a:solidFill>
               </a:rPr>
-              <a:t>Fra gli agenti impegnati si considerano la vicinanza al nuovo target e lontananza dal precedente tracciato</a:t>
+              <a:t>Fra gli agenti impegnati si considerano la vicinanza al nuovo target e lontananza dal target precedente tracciato</a:t>
             </a:r>
           </a:p>
           <a:p>
@@ -11436,7 +11448,7 @@
             <a:pPr rtl="0"/>
             <a:r>
               <a:rPr lang="it-IT" dirty="0"/>
-              <a:t>Protocollo d’asta</a:t>
+              <a:t>Protocollo d’Asta</a:t>
             </a:r>
           </a:p>
         </p:txBody>
@@ -11591,10 +11603,7 @@
           <a:bodyPr/>
           <a:lstStyle/>
           <a:p>
-            <a:r>
-              <a:rPr lang="it-IT" dirty="0"/>
-              <a:t>Numero di target fissato a priori</a:t>
-            </a:r>
+            <a:endParaRPr lang="it-IT" dirty="0"/>
           </a:p>
           <a:p>
             <a:r>
@@ -11647,13 +11656,13 @@
           <p:nvPr>
             <p:extLst>
               <p:ext uri="{D42A27DB-BD31-4B8C-83A1-F6EECF244321}">
-                <p14:modId xmlns:p14="http://schemas.microsoft.com/office/powerpoint/2010/main" val="1266712161"/>
+                <p14:modId xmlns:p14="http://schemas.microsoft.com/office/powerpoint/2010/main" val="2216303847"/>
               </p:ext>
             </p:extLst>
           </p:nvPr>
         </p:nvGraphicFramePr>
         <p:xfrm>
-          <a:off x="1593850" y="3717032"/>
+          <a:off x="1593850" y="3212976"/>
           <a:ext cx="9782176" cy="2225040"/>
         </p:xfrm>
         <a:graphic>

</xml_diff>

<commit_message>
Aggiornata presentazione con animazioni.
</commit_message>
<xml_diff>
--- a/Presentazione MAS/Presentazione MAS.pptx
+++ b/Presentazione MAS/Presentazione MAS.pptx
@@ -244,7 +244,7 @@
             <a:pPr rtl="0"/>
             <a:fld id="{23AEF8A9-CFB5-40C0-BAE2-5B4633EC9F63}" type="datetime1">
               <a:rPr lang="it-IT" smtClean="0"/>
-              <a:t>19/09/2018</a:t>
+              <a:t>20/09/2018</a:t>
             </a:fld>
             <a:endParaRPr lang="it-IT" dirty="0"/>
           </a:p>
@@ -421,7 +421,7 @@
             <a:fld id="{09F431D3-F76B-41A6-8072-4F6D884C46F8}" type="datetime1">
               <a:rPr lang="it-IT" smtClean="0"/>
               <a:pPr/>
-              <a:t>19/09/2018</a:t>
+              <a:t>20/09/2018</a:t>
             </a:fld>
             <a:endParaRPr lang="it-IT" dirty="0"/>
           </a:p>
@@ -2068,7 +2068,7 @@
           <a:p>
             <a:fld id="{FE00C66D-72EC-4F55-BEC8-500A85C081B3}" type="datetime1">
               <a:rPr lang="it-IT" smtClean="0"/>
-              <a:t>19/09/2018</a:t>
+              <a:t>20/09/2018</a:t>
             </a:fld>
             <a:endParaRPr lang="it-IT" dirty="0"/>
           </a:p>
@@ -2341,7 +2341,7 @@
           <a:p>
             <a:fld id="{179FDD90-8460-47A7-A040-CF9AB50248A0}" type="datetime1">
               <a:rPr lang="it-IT" smtClean="0"/>
-              <a:t>19/09/2018</a:t>
+              <a:t>20/09/2018</a:t>
             </a:fld>
             <a:endParaRPr lang="it-IT" dirty="0"/>
           </a:p>
@@ -3168,7 +3168,7 @@
           <a:p>
             <a:fld id="{C35C6EAA-EB31-44A8-9C8F-5624F8F22B6E}" type="datetime1">
               <a:rPr lang="it-IT" smtClean="0"/>
-              <a:t>19/09/2018</a:t>
+              <a:t>20/09/2018</a:t>
             </a:fld>
             <a:endParaRPr lang="it-IT" dirty="0"/>
           </a:p>
@@ -4617,7 +4617,7 @@
           <a:p>
             <a:fld id="{508B2D1E-DF59-4334-A58E-8DEAA289E0E3}" type="datetime1">
               <a:rPr lang="it-IT" smtClean="0"/>
-              <a:t>19/09/2018</a:t>
+              <a:t>20/09/2018</a:t>
             </a:fld>
             <a:endParaRPr lang="it-IT" dirty="0"/>
           </a:p>
@@ -4950,7 +4950,7 @@
           <a:p>
             <a:fld id="{A34FAF5A-4D19-43B1-A45D-8D72A2F8F704}" type="datetime1">
               <a:rPr lang="it-IT" smtClean="0"/>
-              <a:t>19/09/2018</a:t>
+              <a:t>20/09/2018</a:t>
             </a:fld>
             <a:endParaRPr lang="it-IT" dirty="0"/>
           </a:p>
@@ -5409,7 +5409,7 @@
           <a:p>
             <a:fld id="{67C3AB17-3636-4D0B-9DE8-A264915F3F2F}" type="datetime1">
               <a:rPr lang="it-IT" smtClean="0"/>
-              <a:t>19/09/2018</a:t>
+              <a:t>20/09/2018</a:t>
             </a:fld>
             <a:endParaRPr lang="it-IT" dirty="0"/>
           </a:p>
@@ -5550,7 +5550,7 @@
           <a:p>
             <a:fld id="{48D20E2B-0105-405D-B96A-D58D2B631809}" type="datetime1">
               <a:rPr lang="it-IT" smtClean="0"/>
-              <a:t>19/09/2018</a:t>
+              <a:t>20/09/2018</a:t>
             </a:fld>
             <a:endParaRPr lang="it-IT" dirty="0"/>
           </a:p>
@@ -5895,7 +5895,7 @@
           <a:p>
             <a:fld id="{784E50A8-D6B4-4E55-B346-C613EC2AD65E}" type="datetime1">
               <a:rPr lang="it-IT" smtClean="0"/>
-              <a:t>19/09/2018</a:t>
+              <a:t>20/09/2018</a:t>
             </a:fld>
             <a:endParaRPr lang="it-IT" dirty="0"/>
           </a:p>
@@ -6398,7 +6398,7 @@
           <a:p>
             <a:fld id="{FBEB48ED-4E8D-4666-ADC1-9C8D79C0B922}" type="datetime1">
               <a:rPr lang="it-IT" smtClean="0"/>
-              <a:t>19/09/2018</a:t>
+              <a:t>20/09/2018</a:t>
             </a:fld>
             <a:endParaRPr lang="it-IT" dirty="0"/>
           </a:p>
@@ -6854,7 +6854,7 @@
           <a:p>
             <a:fld id="{365EC329-2963-4C84-96E5-2A1FA59F8646}" type="datetime1">
               <a:rPr lang="it-IT" smtClean="0"/>
-              <a:t>19/09/2018</a:t>
+              <a:t>20/09/2018</a:t>
             </a:fld>
             <a:endParaRPr lang="it-IT" dirty="0"/>
           </a:p>
@@ -7432,7 +7432,7 @@
           <a:p>
             <a:fld id="{99CE1268-C6CD-45A8-AABD-978440FDBD0C}" type="datetime1">
               <a:rPr lang="it-IT" smtClean="0"/>
-              <a:t>19/09/2018</a:t>
+              <a:t>20/09/2018</a:t>
             </a:fld>
             <a:endParaRPr lang="it-IT" dirty="0"/>
           </a:p>
@@ -8171,6 +8171,300 @@
           </a:prstGeom>
         </p:spPr>
       </p:pic>
+      <p:cxnSp>
+        <p:nvCxnSpPr>
+          <p:cNvPr id="9" name="Connettore diritto 8"/>
+          <p:cNvCxnSpPr/>
+          <p:nvPr/>
+        </p:nvCxnSpPr>
+        <p:spPr>
+          <a:xfrm flipH="1" flipV="1">
+            <a:off x="2242542" y="3319462"/>
+            <a:ext cx="360040" cy="864096"/>
+          </a:xfrm>
+          <a:prstGeom prst="line">
+            <a:avLst/>
+          </a:prstGeom>
+          <a:ln w="28575"/>
+        </p:spPr>
+        <p:style>
+          <a:lnRef idx="1">
+            <a:schemeClr val="accent2"/>
+          </a:lnRef>
+          <a:fillRef idx="0">
+            <a:schemeClr val="accent2"/>
+          </a:fillRef>
+          <a:effectRef idx="0">
+            <a:schemeClr val="accent2"/>
+          </a:effectRef>
+          <a:fontRef idx="minor">
+            <a:schemeClr val="tx1"/>
+          </a:fontRef>
+        </p:style>
+      </p:cxnSp>
+      <p:cxnSp>
+        <p:nvCxnSpPr>
+          <p:cNvPr id="13" name="Connettore diritto 12"/>
+          <p:cNvCxnSpPr/>
+          <p:nvPr/>
+        </p:nvCxnSpPr>
+        <p:spPr>
+          <a:xfrm flipH="1">
+            <a:off x="2242542" y="5373216"/>
+            <a:ext cx="899542" cy="184621"/>
+          </a:xfrm>
+          <a:prstGeom prst="line">
+            <a:avLst/>
+          </a:prstGeom>
+          <a:ln w="28575"/>
+        </p:spPr>
+        <p:style>
+          <a:lnRef idx="1">
+            <a:schemeClr val="accent2"/>
+          </a:lnRef>
+          <a:fillRef idx="0">
+            <a:schemeClr val="accent2"/>
+          </a:fillRef>
+          <a:effectRef idx="0">
+            <a:schemeClr val="accent2"/>
+          </a:effectRef>
+          <a:fontRef idx="minor">
+            <a:schemeClr val="tx1"/>
+          </a:fontRef>
+        </p:style>
+      </p:cxnSp>
+      <p:cxnSp>
+        <p:nvCxnSpPr>
+          <p:cNvPr id="18" name="Connettore diritto 17"/>
+          <p:cNvCxnSpPr/>
+          <p:nvPr/>
+        </p:nvCxnSpPr>
+        <p:spPr>
+          <a:xfrm flipH="1" flipV="1">
+            <a:off x="4222204" y="4653136"/>
+            <a:ext cx="216024" cy="935570"/>
+          </a:xfrm>
+          <a:prstGeom prst="line">
+            <a:avLst/>
+          </a:prstGeom>
+          <a:ln w="28575"/>
+        </p:spPr>
+        <p:style>
+          <a:lnRef idx="1">
+            <a:schemeClr val="accent2"/>
+          </a:lnRef>
+          <a:fillRef idx="0">
+            <a:schemeClr val="accent2"/>
+          </a:fillRef>
+          <a:effectRef idx="0">
+            <a:schemeClr val="accent2"/>
+          </a:effectRef>
+          <a:fontRef idx="minor">
+            <a:schemeClr val="tx1"/>
+          </a:fontRef>
+        </p:style>
+      </p:cxnSp>
+      <p:cxnSp>
+        <p:nvCxnSpPr>
+          <p:cNvPr id="20" name="Connettore diritto 19"/>
+          <p:cNvCxnSpPr/>
+          <p:nvPr/>
+        </p:nvCxnSpPr>
+        <p:spPr>
+          <a:xfrm flipH="1">
+            <a:off x="3466120" y="3319462"/>
+            <a:ext cx="828092" cy="432048"/>
+          </a:xfrm>
+          <a:prstGeom prst="line">
+            <a:avLst/>
+          </a:prstGeom>
+          <a:ln w="28575"/>
+        </p:spPr>
+        <p:style>
+          <a:lnRef idx="1">
+            <a:schemeClr val="accent2"/>
+          </a:lnRef>
+          <a:fillRef idx="0">
+            <a:schemeClr val="accent2"/>
+          </a:fillRef>
+          <a:effectRef idx="0">
+            <a:schemeClr val="accent2"/>
+          </a:effectRef>
+          <a:fontRef idx="minor">
+            <a:schemeClr val="tx1"/>
+          </a:fontRef>
+        </p:style>
+      </p:cxnSp>
+      <p:sp>
+        <p:nvSpPr>
+          <p:cNvPr id="24" name="Rettangolo 23"/>
+          <p:cNvSpPr/>
+          <p:nvPr/>
+        </p:nvSpPr>
+        <p:spPr>
+          <a:xfrm>
+            <a:off x="5158308" y="4438649"/>
+            <a:ext cx="6552728" cy="1366615"/>
+          </a:xfrm>
+          <a:prstGeom prst="rect">
+            <a:avLst/>
+          </a:prstGeom>
+          <a:solidFill>
+            <a:schemeClr val="bg1"/>
+          </a:solidFill>
+          <a:ln>
+            <a:noFill/>
+          </a:ln>
+        </p:spPr>
+        <p:style>
+          <a:lnRef idx="2">
+            <a:schemeClr val="accent1">
+              <a:shade val="50000"/>
+            </a:schemeClr>
+          </a:lnRef>
+          <a:fillRef idx="1">
+            <a:schemeClr val="accent1"/>
+          </a:fillRef>
+          <a:effectRef idx="0">
+            <a:schemeClr val="accent1"/>
+          </a:effectRef>
+          <a:fontRef idx="minor">
+            <a:schemeClr val="lt1"/>
+          </a:fontRef>
+        </p:style>
+        <p:txBody>
+          <a:bodyPr rtlCol="0" anchor="ctr"/>
+          <a:lstStyle/>
+          <a:p>
+            <a:pPr algn="ctr"/>
+            <a:endParaRPr lang="it-IT"/>
+          </a:p>
+        </p:txBody>
+      </p:sp>
+      <p:cxnSp>
+        <p:nvCxnSpPr>
+          <p:cNvPr id="25" name="Connettore diritto 24"/>
+          <p:cNvCxnSpPr/>
+          <p:nvPr/>
+        </p:nvCxnSpPr>
+        <p:spPr>
+          <a:xfrm flipH="1">
+            <a:off x="2227212" y="4653136"/>
+            <a:ext cx="375370" cy="868200"/>
+          </a:xfrm>
+          <a:prstGeom prst="line">
+            <a:avLst/>
+          </a:prstGeom>
+          <a:ln w="28575"/>
+        </p:spPr>
+        <p:style>
+          <a:lnRef idx="1">
+            <a:schemeClr val="accent2"/>
+          </a:lnRef>
+          <a:fillRef idx="0">
+            <a:schemeClr val="accent2"/>
+          </a:fillRef>
+          <a:effectRef idx="0">
+            <a:schemeClr val="accent2"/>
+          </a:effectRef>
+          <a:fontRef idx="minor">
+            <a:schemeClr val="tx1"/>
+          </a:fontRef>
+        </p:style>
+      </p:cxnSp>
+      <p:cxnSp>
+        <p:nvCxnSpPr>
+          <p:cNvPr id="27" name="Connettore diritto 26"/>
+          <p:cNvCxnSpPr/>
+          <p:nvPr/>
+        </p:nvCxnSpPr>
+        <p:spPr>
+          <a:xfrm flipH="1" flipV="1">
+            <a:off x="2256905" y="3319462"/>
+            <a:ext cx="859086" cy="432048"/>
+          </a:xfrm>
+          <a:prstGeom prst="line">
+            <a:avLst/>
+          </a:prstGeom>
+          <a:ln w="28575"/>
+        </p:spPr>
+        <p:style>
+          <a:lnRef idx="1">
+            <a:schemeClr val="accent2"/>
+          </a:lnRef>
+          <a:fillRef idx="0">
+            <a:schemeClr val="accent2"/>
+          </a:fillRef>
+          <a:effectRef idx="0">
+            <a:schemeClr val="accent2"/>
+          </a:effectRef>
+          <a:fontRef idx="minor">
+            <a:schemeClr val="tx1"/>
+          </a:fontRef>
+        </p:style>
+      </p:cxnSp>
+      <p:cxnSp>
+        <p:nvCxnSpPr>
+          <p:cNvPr id="29" name="Connettore diritto 28"/>
+          <p:cNvCxnSpPr/>
+          <p:nvPr/>
+        </p:nvCxnSpPr>
+        <p:spPr>
+          <a:xfrm flipH="1">
+            <a:off x="4220466" y="3365673"/>
+            <a:ext cx="217762" cy="817885"/>
+          </a:xfrm>
+          <a:prstGeom prst="line">
+            <a:avLst/>
+          </a:prstGeom>
+          <a:ln w="28575"/>
+        </p:spPr>
+        <p:style>
+          <a:lnRef idx="1">
+            <a:schemeClr val="accent2"/>
+          </a:lnRef>
+          <a:fillRef idx="0">
+            <a:schemeClr val="accent2"/>
+          </a:fillRef>
+          <a:effectRef idx="0">
+            <a:schemeClr val="accent2"/>
+          </a:effectRef>
+          <a:fontRef idx="minor">
+            <a:schemeClr val="tx1"/>
+          </a:fontRef>
+        </p:style>
+      </p:cxnSp>
+      <p:cxnSp>
+        <p:nvCxnSpPr>
+          <p:cNvPr id="32" name="Connettore diritto 31"/>
+          <p:cNvCxnSpPr/>
+          <p:nvPr/>
+        </p:nvCxnSpPr>
+        <p:spPr>
+          <a:xfrm flipH="1" flipV="1">
+            <a:off x="3397589" y="5390926"/>
+            <a:ext cx="931758" cy="197780"/>
+          </a:xfrm>
+          <a:prstGeom prst="line">
+            <a:avLst/>
+          </a:prstGeom>
+          <a:ln w="28575"/>
+        </p:spPr>
+        <p:style>
+          <a:lnRef idx="1">
+            <a:schemeClr val="accent2"/>
+          </a:lnRef>
+          <a:fillRef idx="0">
+            <a:schemeClr val="accent2"/>
+          </a:fillRef>
+          <a:effectRef idx="0">
+            <a:schemeClr val="accent2"/>
+          </a:effectRef>
+          <a:fontRef idx="minor">
+            <a:schemeClr val="tx1"/>
+          </a:fontRef>
+        </p:style>
+      </p:cxnSp>
     </p:spTree>
     <p:extLst>
       <p:ext uri="{BB962C8B-B14F-4D97-AF65-F5344CB8AC3E}">
@@ -8193,6 +8487,427 @@
       </p:transition>
     </mc:Fallback>
   </mc:AlternateContent>
+  <p:timing>
+    <p:tnLst>
+      <p:par>
+        <p:cTn id="1" dur="indefinite" restart="never" nodeType="tmRoot">
+          <p:childTnLst>
+            <p:seq concurrent="1" nextAc="seek">
+              <p:cTn id="2" dur="indefinite" nodeType="mainSeq">
+                <p:childTnLst>
+                  <p:par>
+                    <p:cTn id="3" fill="hold">
+                      <p:stCondLst>
+                        <p:cond delay="indefinite"/>
+                      </p:stCondLst>
+                      <p:childTnLst>
+                        <p:par>
+                          <p:cTn id="4" fill="hold">
+                            <p:stCondLst>
+                              <p:cond delay="0"/>
+                            </p:stCondLst>
+                            <p:childTnLst>
+                              <p:par>
+                                <p:cTn id="5" presetID="10" presetClass="exit" presetSubtype="0" fill="hold" nodeType="clickEffect">
+                                  <p:stCondLst>
+                                    <p:cond delay="0"/>
+                                  </p:stCondLst>
+                                  <p:childTnLst>
+                                    <p:animEffect transition="out" filter="fade">
+                                      <p:cBhvr>
+                                        <p:cTn id="6" dur="750"/>
+                                        <p:tgtEl>
+                                          <p:spTgt spid="9"/>
+                                        </p:tgtEl>
+                                      </p:cBhvr>
+                                    </p:animEffect>
+                                    <p:set>
+                                      <p:cBhvr>
+                                        <p:cTn id="7" dur="1" fill="hold">
+                                          <p:stCondLst>
+                                            <p:cond delay="749"/>
+                                          </p:stCondLst>
+                                        </p:cTn>
+                                        <p:tgtEl>
+                                          <p:spTgt spid="9"/>
+                                        </p:tgtEl>
+                                        <p:attrNameLst>
+                                          <p:attrName>style.visibility</p:attrName>
+                                        </p:attrNameLst>
+                                      </p:cBhvr>
+                                      <p:to>
+                                        <p:strVal val="hidden"/>
+                                      </p:to>
+                                    </p:set>
+                                  </p:childTnLst>
+                                </p:cTn>
+                              </p:par>
+                              <p:par>
+                                <p:cTn id="8" presetID="10" presetClass="exit" presetSubtype="0" fill="hold" nodeType="withEffect">
+                                  <p:stCondLst>
+                                    <p:cond delay="0"/>
+                                  </p:stCondLst>
+                                  <p:childTnLst>
+                                    <p:animEffect transition="out" filter="fade">
+                                      <p:cBhvr>
+                                        <p:cTn id="9" dur="750"/>
+                                        <p:tgtEl>
+                                          <p:spTgt spid="20"/>
+                                        </p:tgtEl>
+                                      </p:cBhvr>
+                                    </p:animEffect>
+                                    <p:set>
+                                      <p:cBhvr>
+                                        <p:cTn id="10" dur="1" fill="hold">
+                                          <p:stCondLst>
+                                            <p:cond delay="749"/>
+                                          </p:stCondLst>
+                                        </p:cTn>
+                                        <p:tgtEl>
+                                          <p:spTgt spid="20"/>
+                                        </p:tgtEl>
+                                        <p:attrNameLst>
+                                          <p:attrName>style.visibility</p:attrName>
+                                        </p:attrNameLst>
+                                      </p:cBhvr>
+                                      <p:to>
+                                        <p:strVal val="hidden"/>
+                                      </p:to>
+                                    </p:set>
+                                  </p:childTnLst>
+                                </p:cTn>
+                              </p:par>
+                              <p:par>
+                                <p:cTn id="11" presetID="10" presetClass="exit" presetSubtype="0" fill="hold" nodeType="withEffect">
+                                  <p:stCondLst>
+                                    <p:cond delay="0"/>
+                                  </p:stCondLst>
+                                  <p:childTnLst>
+                                    <p:animEffect transition="out" filter="fade">
+                                      <p:cBhvr>
+                                        <p:cTn id="12" dur="750"/>
+                                        <p:tgtEl>
+                                          <p:spTgt spid="13"/>
+                                        </p:tgtEl>
+                                      </p:cBhvr>
+                                    </p:animEffect>
+                                    <p:set>
+                                      <p:cBhvr>
+                                        <p:cTn id="13" dur="1" fill="hold">
+                                          <p:stCondLst>
+                                            <p:cond delay="749"/>
+                                          </p:stCondLst>
+                                        </p:cTn>
+                                        <p:tgtEl>
+                                          <p:spTgt spid="13"/>
+                                        </p:tgtEl>
+                                        <p:attrNameLst>
+                                          <p:attrName>style.visibility</p:attrName>
+                                        </p:attrNameLst>
+                                      </p:cBhvr>
+                                      <p:to>
+                                        <p:strVal val="hidden"/>
+                                      </p:to>
+                                    </p:set>
+                                  </p:childTnLst>
+                                </p:cTn>
+                              </p:par>
+                              <p:par>
+                                <p:cTn id="14" presetID="10" presetClass="exit" presetSubtype="0" fill="hold" nodeType="withEffect">
+                                  <p:stCondLst>
+                                    <p:cond delay="0"/>
+                                  </p:stCondLst>
+                                  <p:childTnLst>
+                                    <p:animEffect transition="out" filter="fade">
+                                      <p:cBhvr>
+                                        <p:cTn id="15" dur="750"/>
+                                        <p:tgtEl>
+                                          <p:spTgt spid="18"/>
+                                        </p:tgtEl>
+                                      </p:cBhvr>
+                                    </p:animEffect>
+                                    <p:set>
+                                      <p:cBhvr>
+                                        <p:cTn id="16" dur="1" fill="hold">
+                                          <p:stCondLst>
+                                            <p:cond delay="749"/>
+                                          </p:stCondLst>
+                                        </p:cTn>
+                                        <p:tgtEl>
+                                          <p:spTgt spid="18"/>
+                                        </p:tgtEl>
+                                        <p:attrNameLst>
+                                          <p:attrName>style.visibility</p:attrName>
+                                        </p:attrNameLst>
+                                      </p:cBhvr>
+                                      <p:to>
+                                        <p:strVal val="hidden"/>
+                                      </p:to>
+                                    </p:set>
+                                  </p:childTnLst>
+                                </p:cTn>
+                              </p:par>
+                            </p:childTnLst>
+                          </p:cTn>
+                        </p:par>
+                        <p:par>
+                          <p:cTn id="17" fill="hold">
+                            <p:stCondLst>
+                              <p:cond delay="750"/>
+                            </p:stCondLst>
+                            <p:childTnLst>
+                              <p:par>
+                                <p:cTn id="18" presetID="42" presetClass="exit" presetSubtype="0" fill="hold" grpId="0" nodeType="afterEffect">
+                                  <p:stCondLst>
+                                    <p:cond delay="50"/>
+                                  </p:stCondLst>
+                                  <p:childTnLst>
+                                    <p:animEffect transition="out" filter="fade">
+                                      <p:cBhvr>
+                                        <p:cTn id="19" dur="500"/>
+                                        <p:tgtEl>
+                                          <p:spTgt spid="24"/>
+                                        </p:tgtEl>
+                                      </p:cBhvr>
+                                    </p:animEffect>
+                                    <p:anim calcmode="lin" valueType="num">
+                                      <p:cBhvr>
+                                        <p:cTn id="20" dur="500"/>
+                                        <p:tgtEl>
+                                          <p:spTgt spid="24"/>
+                                        </p:tgtEl>
+                                        <p:attrNameLst>
+                                          <p:attrName>ppt_x</p:attrName>
+                                        </p:attrNameLst>
+                                      </p:cBhvr>
+                                      <p:tavLst>
+                                        <p:tav tm="0">
+                                          <p:val>
+                                            <p:strVal val="ppt_x"/>
+                                          </p:val>
+                                        </p:tav>
+                                        <p:tav tm="100000">
+                                          <p:val>
+                                            <p:strVal val="ppt_x"/>
+                                          </p:val>
+                                        </p:tav>
+                                      </p:tavLst>
+                                    </p:anim>
+                                    <p:anim calcmode="lin" valueType="num">
+                                      <p:cBhvr>
+                                        <p:cTn id="21" dur="500"/>
+                                        <p:tgtEl>
+                                          <p:spTgt spid="24"/>
+                                        </p:tgtEl>
+                                        <p:attrNameLst>
+                                          <p:attrName>ppt_y</p:attrName>
+                                        </p:attrNameLst>
+                                      </p:cBhvr>
+                                      <p:tavLst>
+                                        <p:tav tm="0">
+                                          <p:val>
+                                            <p:strVal val="ppt_y"/>
+                                          </p:val>
+                                        </p:tav>
+                                        <p:tav tm="100000">
+                                          <p:val>
+                                            <p:strVal val="ppt_y+.1"/>
+                                          </p:val>
+                                        </p:tav>
+                                      </p:tavLst>
+                                    </p:anim>
+                                    <p:set>
+                                      <p:cBhvr>
+                                        <p:cTn id="22" dur="1" fill="hold">
+                                          <p:stCondLst>
+                                            <p:cond delay="499"/>
+                                          </p:stCondLst>
+                                        </p:cTn>
+                                        <p:tgtEl>
+                                          <p:spTgt spid="24"/>
+                                        </p:tgtEl>
+                                        <p:attrNameLst>
+                                          <p:attrName>style.visibility</p:attrName>
+                                        </p:attrNameLst>
+                                      </p:cBhvr>
+                                      <p:to>
+                                        <p:strVal val="hidden"/>
+                                      </p:to>
+                                    </p:set>
+                                  </p:childTnLst>
+                                </p:cTn>
+                              </p:par>
+                              <p:par>
+                                <p:cTn id="23" presetID="10" presetClass="entr" presetSubtype="0" fill="hold" nodeType="withEffect">
+                                  <p:stCondLst>
+                                    <p:cond delay="0"/>
+                                  </p:stCondLst>
+                                  <p:childTnLst>
+                                    <p:set>
+                                      <p:cBhvr>
+                                        <p:cTn id="24" dur="1" fill="hold">
+                                          <p:stCondLst>
+                                            <p:cond delay="0"/>
+                                          </p:stCondLst>
+                                        </p:cTn>
+                                        <p:tgtEl>
+                                          <p:spTgt spid="25"/>
+                                        </p:tgtEl>
+                                        <p:attrNameLst>
+                                          <p:attrName>style.visibility</p:attrName>
+                                        </p:attrNameLst>
+                                      </p:cBhvr>
+                                      <p:to>
+                                        <p:strVal val="visible"/>
+                                      </p:to>
+                                    </p:set>
+                                    <p:animEffect transition="in" filter="fade">
+                                      <p:cBhvr>
+                                        <p:cTn id="25" dur="500"/>
+                                        <p:tgtEl>
+                                          <p:spTgt spid="25"/>
+                                        </p:tgtEl>
+                                      </p:cBhvr>
+                                    </p:animEffect>
+                                  </p:childTnLst>
+                                </p:cTn>
+                              </p:par>
+                              <p:par>
+                                <p:cTn id="26" presetID="10" presetClass="entr" presetSubtype="0" fill="hold" nodeType="withEffect">
+                                  <p:stCondLst>
+                                    <p:cond delay="0"/>
+                                  </p:stCondLst>
+                                  <p:childTnLst>
+                                    <p:set>
+                                      <p:cBhvr>
+                                        <p:cTn id="27" dur="1" fill="hold">
+                                          <p:stCondLst>
+                                            <p:cond delay="0"/>
+                                          </p:stCondLst>
+                                        </p:cTn>
+                                        <p:tgtEl>
+                                          <p:spTgt spid="27"/>
+                                        </p:tgtEl>
+                                        <p:attrNameLst>
+                                          <p:attrName>style.visibility</p:attrName>
+                                        </p:attrNameLst>
+                                      </p:cBhvr>
+                                      <p:to>
+                                        <p:strVal val="visible"/>
+                                      </p:to>
+                                    </p:set>
+                                    <p:animEffect transition="in" filter="fade">
+                                      <p:cBhvr>
+                                        <p:cTn id="28" dur="500"/>
+                                        <p:tgtEl>
+                                          <p:spTgt spid="27"/>
+                                        </p:tgtEl>
+                                      </p:cBhvr>
+                                    </p:animEffect>
+                                  </p:childTnLst>
+                                </p:cTn>
+                              </p:par>
+                              <p:par>
+                                <p:cTn id="29" presetID="10" presetClass="entr" presetSubtype="0" fill="hold" nodeType="withEffect">
+                                  <p:stCondLst>
+                                    <p:cond delay="0"/>
+                                  </p:stCondLst>
+                                  <p:childTnLst>
+                                    <p:set>
+                                      <p:cBhvr>
+                                        <p:cTn id="30" dur="1" fill="hold">
+                                          <p:stCondLst>
+                                            <p:cond delay="0"/>
+                                          </p:stCondLst>
+                                        </p:cTn>
+                                        <p:tgtEl>
+                                          <p:spTgt spid="29"/>
+                                        </p:tgtEl>
+                                        <p:attrNameLst>
+                                          <p:attrName>style.visibility</p:attrName>
+                                        </p:attrNameLst>
+                                      </p:cBhvr>
+                                      <p:to>
+                                        <p:strVal val="visible"/>
+                                      </p:to>
+                                    </p:set>
+                                    <p:animEffect transition="in" filter="fade">
+                                      <p:cBhvr>
+                                        <p:cTn id="31" dur="500"/>
+                                        <p:tgtEl>
+                                          <p:spTgt spid="29"/>
+                                        </p:tgtEl>
+                                      </p:cBhvr>
+                                    </p:animEffect>
+                                  </p:childTnLst>
+                                </p:cTn>
+                              </p:par>
+                              <p:par>
+                                <p:cTn id="32" presetID="10" presetClass="entr" presetSubtype="0" fill="hold" nodeType="withEffect">
+                                  <p:stCondLst>
+                                    <p:cond delay="0"/>
+                                  </p:stCondLst>
+                                  <p:childTnLst>
+                                    <p:set>
+                                      <p:cBhvr>
+                                        <p:cTn id="33" dur="1" fill="hold">
+                                          <p:stCondLst>
+                                            <p:cond delay="0"/>
+                                          </p:stCondLst>
+                                        </p:cTn>
+                                        <p:tgtEl>
+                                          <p:spTgt spid="32"/>
+                                        </p:tgtEl>
+                                        <p:attrNameLst>
+                                          <p:attrName>style.visibility</p:attrName>
+                                        </p:attrNameLst>
+                                      </p:cBhvr>
+                                      <p:to>
+                                        <p:strVal val="visible"/>
+                                      </p:to>
+                                    </p:set>
+                                    <p:animEffect transition="in" filter="fade">
+                                      <p:cBhvr>
+                                        <p:cTn id="34" dur="500"/>
+                                        <p:tgtEl>
+                                          <p:spTgt spid="32"/>
+                                        </p:tgtEl>
+                                      </p:cBhvr>
+                                    </p:animEffect>
+                                  </p:childTnLst>
+                                </p:cTn>
+                              </p:par>
+                            </p:childTnLst>
+                          </p:cTn>
+                        </p:par>
+                      </p:childTnLst>
+                    </p:cTn>
+                  </p:par>
+                </p:childTnLst>
+              </p:cTn>
+              <p:prevCondLst>
+                <p:cond evt="onPrev" delay="0">
+                  <p:tgtEl>
+                    <p:sldTgt/>
+                  </p:tgtEl>
+                </p:cond>
+              </p:prevCondLst>
+              <p:nextCondLst>
+                <p:cond evt="onNext" delay="0">
+                  <p:tgtEl>
+                    <p:sldTgt/>
+                  </p:tgtEl>
+                </p:cond>
+              </p:nextCondLst>
+            </p:seq>
+          </p:childTnLst>
+        </p:cTn>
+      </p:par>
+    </p:tnLst>
+    <p:bldLst>
+      <p:bldP spid="24" grpId="0" animBg="1"/>
+    </p:bldLst>
+  </p:timing>
 </p:sld>
 </file>
 
@@ -8329,6 +9044,176 @@
           </a:prstGeom>
         </p:spPr>
       </p:pic>
+      <p:cxnSp>
+        <p:nvCxnSpPr>
+          <p:cNvPr id="6" name="Connettore diritto 5"/>
+          <p:cNvCxnSpPr/>
+          <p:nvPr/>
+        </p:nvCxnSpPr>
+        <p:spPr>
+          <a:xfrm flipH="1" flipV="1">
+            <a:off x="2277988" y="3501008"/>
+            <a:ext cx="916364" cy="937641"/>
+          </a:xfrm>
+          <a:prstGeom prst="line">
+            <a:avLst/>
+          </a:prstGeom>
+          <a:ln w="28575"/>
+        </p:spPr>
+        <p:style>
+          <a:lnRef idx="1">
+            <a:schemeClr val="accent2"/>
+          </a:lnRef>
+          <a:fillRef idx="0">
+            <a:schemeClr val="accent2"/>
+          </a:fillRef>
+          <a:effectRef idx="0">
+            <a:schemeClr val="accent2"/>
+          </a:effectRef>
+          <a:fontRef idx="minor">
+            <a:schemeClr val="tx1"/>
+          </a:fontRef>
+        </p:style>
+      </p:cxnSp>
+      <p:cxnSp>
+        <p:nvCxnSpPr>
+          <p:cNvPr id="13" name="Connettore diritto 12"/>
+          <p:cNvCxnSpPr/>
+          <p:nvPr/>
+        </p:nvCxnSpPr>
+        <p:spPr>
+          <a:xfrm flipH="1">
+            <a:off x="3718148" y="3379717"/>
+            <a:ext cx="648072" cy="409323"/>
+          </a:xfrm>
+          <a:prstGeom prst="line">
+            <a:avLst/>
+          </a:prstGeom>
+          <a:ln w="28575"/>
+        </p:spPr>
+        <p:style>
+          <a:lnRef idx="1">
+            <a:schemeClr val="accent2"/>
+          </a:lnRef>
+          <a:fillRef idx="0">
+            <a:schemeClr val="accent2"/>
+          </a:fillRef>
+          <a:effectRef idx="0">
+            <a:schemeClr val="accent2"/>
+          </a:effectRef>
+          <a:fontRef idx="minor">
+            <a:schemeClr val="tx1"/>
+          </a:fontRef>
+        </p:style>
+      </p:cxnSp>
+      <p:cxnSp>
+        <p:nvCxnSpPr>
+          <p:cNvPr id="16" name="Connettore diritto 15"/>
+          <p:cNvCxnSpPr/>
+          <p:nvPr/>
+        </p:nvCxnSpPr>
+        <p:spPr>
+          <a:xfrm flipV="1">
+            <a:off x="4438228" y="5373216"/>
+            <a:ext cx="216024" cy="361661"/>
+          </a:xfrm>
+          <a:prstGeom prst="line">
+            <a:avLst/>
+          </a:prstGeom>
+          <a:ln w="28575"/>
+        </p:spPr>
+        <p:style>
+          <a:lnRef idx="1">
+            <a:schemeClr val="accent2"/>
+          </a:lnRef>
+          <a:fillRef idx="0">
+            <a:schemeClr val="accent2"/>
+          </a:fillRef>
+          <a:effectRef idx="0">
+            <a:schemeClr val="accent2"/>
+          </a:effectRef>
+          <a:fontRef idx="minor">
+            <a:schemeClr val="tx1"/>
+          </a:fontRef>
+        </p:style>
+      </p:cxnSp>
+      <p:sp>
+        <p:nvSpPr>
+          <p:cNvPr id="19" name="Rettangolo 18"/>
+          <p:cNvSpPr/>
+          <p:nvPr/>
+        </p:nvSpPr>
+        <p:spPr>
+          <a:xfrm>
+            <a:off x="5158308" y="4438649"/>
+            <a:ext cx="6552728" cy="1366615"/>
+          </a:xfrm>
+          <a:prstGeom prst="rect">
+            <a:avLst/>
+          </a:prstGeom>
+          <a:solidFill>
+            <a:schemeClr val="bg1"/>
+          </a:solidFill>
+          <a:ln>
+            <a:noFill/>
+          </a:ln>
+        </p:spPr>
+        <p:style>
+          <a:lnRef idx="2">
+            <a:schemeClr val="accent1">
+              <a:shade val="50000"/>
+            </a:schemeClr>
+          </a:lnRef>
+          <a:fillRef idx="1">
+            <a:schemeClr val="accent1"/>
+          </a:fillRef>
+          <a:effectRef idx="0">
+            <a:schemeClr val="accent1"/>
+          </a:effectRef>
+          <a:fontRef idx="minor">
+            <a:schemeClr val="lt1"/>
+          </a:fontRef>
+        </p:style>
+        <p:txBody>
+          <a:bodyPr rtlCol="0" anchor="ctr"/>
+          <a:lstStyle/>
+          <a:p>
+            <a:pPr algn="ctr"/>
+            <a:endParaRPr lang="it-IT"/>
+          </a:p>
+        </p:txBody>
+      </p:sp>
+      <p:cxnSp>
+        <p:nvCxnSpPr>
+          <p:cNvPr id="20" name="Connettore diritto 19"/>
+          <p:cNvCxnSpPr/>
+          <p:nvPr/>
+        </p:nvCxnSpPr>
+        <p:spPr>
+          <a:xfrm flipH="1" flipV="1">
+            <a:off x="3407459" y="4797211"/>
+            <a:ext cx="916364" cy="937641"/>
+          </a:xfrm>
+          <a:prstGeom prst="line">
+            <a:avLst/>
+          </a:prstGeom>
+          <a:ln w="28575"/>
+        </p:spPr>
+        <p:style>
+          <a:lnRef idx="1">
+            <a:schemeClr val="accent2"/>
+          </a:lnRef>
+          <a:fillRef idx="0">
+            <a:schemeClr val="accent2"/>
+          </a:fillRef>
+          <a:effectRef idx="0">
+            <a:schemeClr val="accent2"/>
+          </a:effectRef>
+          <a:fontRef idx="minor">
+            <a:schemeClr val="tx1"/>
+          </a:fontRef>
+        </p:style>
+      </p:cxnSp>
     </p:spTree>
     <p:extLst>
       <p:ext uri="{BB962C8B-B14F-4D97-AF65-F5344CB8AC3E}">
@@ -8351,6 +9236,322 @@
       </p:transition>
     </mc:Fallback>
   </mc:AlternateContent>
+  <p:timing>
+    <p:tnLst>
+      <p:par>
+        <p:cTn id="1" dur="indefinite" restart="never" nodeType="tmRoot">
+          <p:childTnLst>
+            <p:seq concurrent="1" nextAc="seek">
+              <p:cTn id="2" dur="indefinite" nodeType="mainSeq">
+                <p:childTnLst>
+                  <p:par>
+                    <p:cTn id="3" fill="hold">
+                      <p:stCondLst>
+                        <p:cond delay="indefinite"/>
+                      </p:stCondLst>
+                      <p:childTnLst>
+                        <p:par>
+                          <p:cTn id="4" fill="hold">
+                            <p:stCondLst>
+                              <p:cond delay="0"/>
+                            </p:stCondLst>
+                            <p:childTnLst>
+                              <p:par>
+                                <p:cTn id="5" presetID="10" presetClass="exit" presetSubtype="0" fill="hold" nodeType="clickEffect">
+                                  <p:stCondLst>
+                                    <p:cond delay="0"/>
+                                  </p:stCondLst>
+                                  <p:childTnLst>
+                                    <p:animEffect transition="out" filter="fade">
+                                      <p:cBhvr>
+                                        <p:cTn id="6" dur="750"/>
+                                        <p:tgtEl>
+                                          <p:spTgt spid="6"/>
+                                        </p:tgtEl>
+                                      </p:cBhvr>
+                                    </p:animEffect>
+                                    <p:set>
+                                      <p:cBhvr>
+                                        <p:cTn id="7" dur="1" fill="hold">
+                                          <p:stCondLst>
+                                            <p:cond delay="749"/>
+                                          </p:stCondLst>
+                                        </p:cTn>
+                                        <p:tgtEl>
+                                          <p:spTgt spid="6"/>
+                                        </p:tgtEl>
+                                        <p:attrNameLst>
+                                          <p:attrName>style.visibility</p:attrName>
+                                        </p:attrNameLst>
+                                      </p:cBhvr>
+                                      <p:to>
+                                        <p:strVal val="hidden"/>
+                                      </p:to>
+                                    </p:set>
+                                  </p:childTnLst>
+                                </p:cTn>
+                              </p:par>
+                              <p:par>
+                                <p:cTn id="8" presetID="10" presetClass="exit" presetSubtype="0" fill="hold" nodeType="withEffect">
+                                  <p:stCondLst>
+                                    <p:cond delay="0"/>
+                                  </p:stCondLst>
+                                  <p:childTnLst>
+                                    <p:animEffect transition="out" filter="fade">
+                                      <p:cBhvr>
+                                        <p:cTn id="9" dur="750"/>
+                                        <p:tgtEl>
+                                          <p:spTgt spid="13"/>
+                                        </p:tgtEl>
+                                      </p:cBhvr>
+                                    </p:animEffect>
+                                    <p:set>
+                                      <p:cBhvr>
+                                        <p:cTn id="10" dur="1" fill="hold">
+                                          <p:stCondLst>
+                                            <p:cond delay="749"/>
+                                          </p:stCondLst>
+                                        </p:cTn>
+                                        <p:tgtEl>
+                                          <p:spTgt spid="13"/>
+                                        </p:tgtEl>
+                                        <p:attrNameLst>
+                                          <p:attrName>style.visibility</p:attrName>
+                                        </p:attrNameLst>
+                                      </p:cBhvr>
+                                      <p:to>
+                                        <p:strVal val="hidden"/>
+                                      </p:to>
+                                    </p:set>
+                                  </p:childTnLst>
+                                </p:cTn>
+                              </p:par>
+                              <p:par>
+                                <p:cTn id="11" presetID="10" presetClass="exit" presetSubtype="0" fill="hold" nodeType="withEffect">
+                                  <p:stCondLst>
+                                    <p:cond delay="0"/>
+                                  </p:stCondLst>
+                                  <p:childTnLst>
+                                    <p:animEffect transition="out" filter="fade">
+                                      <p:cBhvr>
+                                        <p:cTn id="12" dur="750"/>
+                                        <p:tgtEl>
+                                          <p:spTgt spid="16"/>
+                                        </p:tgtEl>
+                                      </p:cBhvr>
+                                    </p:animEffect>
+                                    <p:set>
+                                      <p:cBhvr>
+                                        <p:cTn id="13" dur="1" fill="hold">
+                                          <p:stCondLst>
+                                            <p:cond delay="749"/>
+                                          </p:stCondLst>
+                                        </p:cTn>
+                                        <p:tgtEl>
+                                          <p:spTgt spid="16"/>
+                                        </p:tgtEl>
+                                        <p:attrNameLst>
+                                          <p:attrName>style.visibility</p:attrName>
+                                        </p:attrNameLst>
+                                      </p:cBhvr>
+                                      <p:to>
+                                        <p:strVal val="hidden"/>
+                                      </p:to>
+                                    </p:set>
+                                  </p:childTnLst>
+                                </p:cTn>
+                              </p:par>
+                            </p:childTnLst>
+                          </p:cTn>
+                        </p:par>
+                        <p:par>
+                          <p:cTn id="14" fill="hold">
+                            <p:stCondLst>
+                              <p:cond delay="750"/>
+                            </p:stCondLst>
+                            <p:childTnLst>
+                              <p:par>
+                                <p:cTn id="15" presetID="42" presetClass="exit" presetSubtype="0" fill="hold" grpId="0" nodeType="afterEffect">
+                                  <p:stCondLst>
+                                    <p:cond delay="50"/>
+                                  </p:stCondLst>
+                                  <p:childTnLst>
+                                    <p:animEffect transition="out" filter="fade">
+                                      <p:cBhvr>
+                                        <p:cTn id="16" dur="500"/>
+                                        <p:tgtEl>
+                                          <p:spTgt spid="19"/>
+                                        </p:tgtEl>
+                                      </p:cBhvr>
+                                    </p:animEffect>
+                                    <p:anim calcmode="lin" valueType="num">
+                                      <p:cBhvr>
+                                        <p:cTn id="17" dur="500"/>
+                                        <p:tgtEl>
+                                          <p:spTgt spid="19"/>
+                                        </p:tgtEl>
+                                        <p:attrNameLst>
+                                          <p:attrName>ppt_x</p:attrName>
+                                        </p:attrNameLst>
+                                      </p:cBhvr>
+                                      <p:tavLst>
+                                        <p:tav tm="0">
+                                          <p:val>
+                                            <p:strVal val="ppt_x"/>
+                                          </p:val>
+                                        </p:tav>
+                                        <p:tav tm="100000">
+                                          <p:val>
+                                            <p:strVal val="ppt_x"/>
+                                          </p:val>
+                                        </p:tav>
+                                      </p:tavLst>
+                                    </p:anim>
+                                    <p:anim calcmode="lin" valueType="num">
+                                      <p:cBhvr>
+                                        <p:cTn id="18" dur="500"/>
+                                        <p:tgtEl>
+                                          <p:spTgt spid="19"/>
+                                        </p:tgtEl>
+                                        <p:attrNameLst>
+                                          <p:attrName>ppt_y</p:attrName>
+                                        </p:attrNameLst>
+                                      </p:cBhvr>
+                                      <p:tavLst>
+                                        <p:tav tm="0">
+                                          <p:val>
+                                            <p:strVal val="ppt_y"/>
+                                          </p:val>
+                                        </p:tav>
+                                        <p:tav tm="100000">
+                                          <p:val>
+                                            <p:strVal val="ppt_y+.1"/>
+                                          </p:val>
+                                        </p:tav>
+                                      </p:tavLst>
+                                    </p:anim>
+                                    <p:set>
+                                      <p:cBhvr>
+                                        <p:cTn id="19" dur="1" fill="hold">
+                                          <p:stCondLst>
+                                            <p:cond delay="499"/>
+                                          </p:stCondLst>
+                                        </p:cTn>
+                                        <p:tgtEl>
+                                          <p:spTgt spid="19"/>
+                                        </p:tgtEl>
+                                        <p:attrNameLst>
+                                          <p:attrName>style.visibility</p:attrName>
+                                        </p:attrNameLst>
+                                      </p:cBhvr>
+                                      <p:to>
+                                        <p:strVal val="hidden"/>
+                                      </p:to>
+                                    </p:set>
+                                  </p:childTnLst>
+                                </p:cTn>
+                              </p:par>
+                              <p:par>
+                                <p:cTn id="20" presetID="10" presetClass="entr" presetSubtype="0" fill="hold" nodeType="withEffect">
+                                  <p:stCondLst>
+                                    <p:cond delay="50"/>
+                                  </p:stCondLst>
+                                  <p:childTnLst>
+                                    <p:set>
+                                      <p:cBhvr>
+                                        <p:cTn id="21" dur="1" fill="hold">
+                                          <p:stCondLst>
+                                            <p:cond delay="0"/>
+                                          </p:stCondLst>
+                                        </p:cTn>
+                                        <p:tgtEl>
+                                          <p:spTgt spid="20"/>
+                                        </p:tgtEl>
+                                        <p:attrNameLst>
+                                          <p:attrName>style.visibility</p:attrName>
+                                        </p:attrNameLst>
+                                      </p:cBhvr>
+                                      <p:to>
+                                        <p:strVal val="visible"/>
+                                      </p:to>
+                                    </p:set>
+                                    <p:animEffect transition="in" filter="fade">
+                                      <p:cBhvr>
+                                        <p:cTn id="22" dur="500"/>
+                                        <p:tgtEl>
+                                          <p:spTgt spid="20"/>
+                                        </p:tgtEl>
+                                      </p:cBhvr>
+                                    </p:animEffect>
+                                  </p:childTnLst>
+                                </p:cTn>
+                              </p:par>
+                              <p:par>
+                                <p:cTn id="23" presetID="10" presetClass="entr" presetSubtype="0" fill="hold" nodeType="withEffect">
+                                  <p:stCondLst>
+                                    <p:cond delay="50"/>
+                                  </p:stCondLst>
+                                  <p:childTnLst>
+                                    <p:set>
+                                      <p:cBhvr>
+                                        <p:cTn id="24" dur="1" fill="hold">
+                                          <p:stCondLst>
+                                            <p:cond delay="0"/>
+                                          </p:stCondLst>
+                                        </p:cTn>
+                                        <p:tgtEl>
+                                          <p:spTgt spid="13"/>
+                                        </p:tgtEl>
+                                        <p:attrNameLst>
+                                          <p:attrName>style.visibility</p:attrName>
+                                        </p:attrNameLst>
+                                      </p:cBhvr>
+                                      <p:to>
+                                        <p:strVal val="visible"/>
+                                      </p:to>
+                                    </p:set>
+                                    <p:animEffect transition="in" filter="fade">
+                                      <p:cBhvr>
+                                        <p:cTn id="25" dur="500"/>
+                                        <p:tgtEl>
+                                          <p:spTgt spid="13"/>
+                                        </p:tgtEl>
+                                      </p:cBhvr>
+                                    </p:animEffect>
+                                  </p:childTnLst>
+                                </p:cTn>
+                              </p:par>
+                            </p:childTnLst>
+                          </p:cTn>
+                        </p:par>
+                      </p:childTnLst>
+                    </p:cTn>
+                  </p:par>
+                </p:childTnLst>
+              </p:cTn>
+              <p:prevCondLst>
+                <p:cond evt="onPrev" delay="0">
+                  <p:tgtEl>
+                    <p:sldTgt/>
+                  </p:tgtEl>
+                </p:cond>
+              </p:prevCondLst>
+              <p:nextCondLst>
+                <p:cond evt="onNext" delay="0">
+                  <p:tgtEl>
+                    <p:sldTgt/>
+                  </p:tgtEl>
+                </p:cond>
+              </p:nextCondLst>
+            </p:seq>
+          </p:childTnLst>
+        </p:cTn>
+      </p:par>
+    </p:tnLst>
+    <p:bldLst>
+      <p:bldP spid="19" grpId="0" animBg="1"/>
+    </p:bldLst>
+  </p:timing>
 </p:sld>
 </file>
 
@@ -8487,6 +9688,145 @@
           </a:prstGeom>
         </p:spPr>
       </p:pic>
+      <p:sp>
+        <p:nvSpPr>
+          <p:cNvPr id="6" name="Rettangolo 5"/>
+          <p:cNvSpPr/>
+          <p:nvPr/>
+        </p:nvSpPr>
+        <p:spPr>
+          <a:xfrm>
+            <a:off x="5302324" y="4365104"/>
+            <a:ext cx="6480720" cy="1224136"/>
+          </a:xfrm>
+          <a:prstGeom prst="rect">
+            <a:avLst/>
+          </a:prstGeom>
+          <a:solidFill>
+            <a:schemeClr val="bg1"/>
+          </a:solidFill>
+          <a:ln>
+            <a:noFill/>
+          </a:ln>
+        </p:spPr>
+        <p:style>
+          <a:lnRef idx="2">
+            <a:schemeClr val="accent1">
+              <a:shade val="50000"/>
+            </a:schemeClr>
+          </a:lnRef>
+          <a:fillRef idx="1">
+            <a:schemeClr val="accent1"/>
+          </a:fillRef>
+          <a:effectRef idx="0">
+            <a:schemeClr val="accent1"/>
+          </a:effectRef>
+          <a:fontRef idx="minor">
+            <a:schemeClr val="lt1"/>
+          </a:fontRef>
+        </p:style>
+        <p:txBody>
+          <a:bodyPr rtlCol="0" anchor="ctr"/>
+          <a:lstStyle/>
+          <a:p>
+            <a:pPr algn="ctr"/>
+            <a:endParaRPr lang="it-IT"/>
+          </a:p>
+        </p:txBody>
+      </p:sp>
+      <p:cxnSp>
+        <p:nvCxnSpPr>
+          <p:cNvPr id="8" name="Connettore diritto 7"/>
+          <p:cNvCxnSpPr/>
+          <p:nvPr/>
+        </p:nvCxnSpPr>
+        <p:spPr>
+          <a:xfrm flipH="1" flipV="1">
+            <a:off x="2349996" y="3379717"/>
+            <a:ext cx="792089" cy="913379"/>
+          </a:xfrm>
+          <a:prstGeom prst="line">
+            <a:avLst/>
+          </a:prstGeom>
+          <a:ln w="28575"/>
+        </p:spPr>
+        <p:style>
+          <a:lnRef idx="1">
+            <a:schemeClr val="accent2"/>
+          </a:lnRef>
+          <a:fillRef idx="0">
+            <a:schemeClr val="accent2"/>
+          </a:fillRef>
+          <a:effectRef idx="0">
+            <a:schemeClr val="accent2"/>
+          </a:effectRef>
+          <a:fontRef idx="minor">
+            <a:schemeClr val="tx1"/>
+          </a:fontRef>
+        </p:style>
+      </p:cxnSp>
+      <p:cxnSp>
+        <p:nvCxnSpPr>
+          <p:cNvPr id="10" name="Connettore diritto 9"/>
+          <p:cNvCxnSpPr/>
+          <p:nvPr/>
+        </p:nvCxnSpPr>
+        <p:spPr>
+          <a:xfrm flipV="1">
+            <a:off x="3718148" y="3379718"/>
+            <a:ext cx="504057" cy="337314"/>
+          </a:xfrm>
+          <a:prstGeom prst="line">
+            <a:avLst/>
+          </a:prstGeom>
+          <a:ln w="28575"/>
+        </p:spPr>
+        <p:style>
+          <a:lnRef idx="1">
+            <a:schemeClr val="accent2"/>
+          </a:lnRef>
+          <a:fillRef idx="0">
+            <a:schemeClr val="accent2"/>
+          </a:fillRef>
+          <a:effectRef idx="0">
+            <a:schemeClr val="accent2"/>
+          </a:effectRef>
+          <a:fontRef idx="minor">
+            <a:schemeClr val="tx1"/>
+          </a:fontRef>
+        </p:style>
+      </p:cxnSp>
+      <p:cxnSp>
+        <p:nvCxnSpPr>
+          <p:cNvPr id="13" name="Connettore diritto 12"/>
+          <p:cNvCxnSpPr/>
+          <p:nvPr/>
+        </p:nvCxnSpPr>
+        <p:spPr>
+          <a:xfrm flipH="1" flipV="1">
+            <a:off x="4222205" y="5157192"/>
+            <a:ext cx="144015" cy="288032"/>
+          </a:xfrm>
+          <a:prstGeom prst="line">
+            <a:avLst/>
+          </a:prstGeom>
+          <a:ln w="28575"/>
+        </p:spPr>
+        <p:style>
+          <a:lnRef idx="1">
+            <a:schemeClr val="accent2"/>
+          </a:lnRef>
+          <a:fillRef idx="0">
+            <a:schemeClr val="accent2"/>
+          </a:fillRef>
+          <a:effectRef idx="0">
+            <a:schemeClr val="accent2"/>
+          </a:effectRef>
+          <a:fontRef idx="minor">
+            <a:schemeClr val="tx1"/>
+          </a:fontRef>
+        </p:style>
+      </p:cxnSp>
     </p:spTree>
     <p:extLst>
       <p:ext uri="{BB962C8B-B14F-4D97-AF65-F5344CB8AC3E}">
@@ -8509,6 +9849,138 @@
       </p:transition>
     </mc:Fallback>
   </mc:AlternateContent>
+  <p:timing>
+    <p:tnLst>
+      <p:par>
+        <p:cTn id="1" dur="indefinite" restart="never" nodeType="tmRoot">
+          <p:childTnLst>
+            <p:seq concurrent="1" nextAc="seek">
+              <p:cTn id="2" dur="indefinite" nodeType="mainSeq">
+                <p:childTnLst>
+                  <p:par>
+                    <p:cTn id="3" fill="hold">
+                      <p:stCondLst>
+                        <p:cond delay="indefinite"/>
+                      </p:stCondLst>
+                      <p:childTnLst>
+                        <p:par>
+                          <p:cTn id="4" fill="hold">
+                            <p:stCondLst>
+                              <p:cond delay="0"/>
+                            </p:stCondLst>
+                            <p:childTnLst>
+                              <p:par>
+                                <p:cTn id="5" presetID="42" presetClass="exit" presetSubtype="0" fill="hold" grpId="0" nodeType="clickEffect">
+                                  <p:stCondLst>
+                                    <p:cond delay="0"/>
+                                  </p:stCondLst>
+                                  <p:childTnLst>
+                                    <p:animEffect transition="out" filter="fade">
+                                      <p:cBhvr>
+                                        <p:cTn id="6" dur="500"/>
+                                        <p:tgtEl>
+                                          <p:spTgt spid="6"/>
+                                        </p:tgtEl>
+                                      </p:cBhvr>
+                                    </p:animEffect>
+                                    <p:anim calcmode="lin" valueType="num">
+                                      <p:cBhvr>
+                                        <p:cTn id="7" dur="500"/>
+                                        <p:tgtEl>
+                                          <p:spTgt spid="6"/>
+                                        </p:tgtEl>
+                                        <p:attrNameLst>
+                                          <p:attrName>ppt_x</p:attrName>
+                                        </p:attrNameLst>
+                                      </p:cBhvr>
+                                      <p:tavLst>
+                                        <p:tav tm="0">
+                                          <p:val>
+                                            <p:strVal val="ppt_x"/>
+                                          </p:val>
+                                        </p:tav>
+                                        <p:tav tm="100000">
+                                          <p:val>
+                                            <p:strVal val="ppt_x"/>
+                                          </p:val>
+                                        </p:tav>
+                                      </p:tavLst>
+                                    </p:anim>
+                                    <p:anim calcmode="lin" valueType="num">
+                                      <p:cBhvr>
+                                        <p:cTn id="8" dur="500"/>
+                                        <p:tgtEl>
+                                          <p:spTgt spid="6"/>
+                                        </p:tgtEl>
+                                        <p:attrNameLst>
+                                          <p:attrName>ppt_y</p:attrName>
+                                        </p:attrNameLst>
+                                      </p:cBhvr>
+                                      <p:tavLst>
+                                        <p:tav tm="0">
+                                          <p:val>
+                                            <p:strVal val="ppt_y"/>
+                                          </p:val>
+                                        </p:tav>
+                                        <p:tav tm="100000">
+                                          <p:val>
+                                            <p:strVal val="ppt_y+.1"/>
+                                          </p:val>
+                                        </p:tav>
+                                      </p:tavLst>
+                                    </p:anim>
+                                    <p:set>
+                                      <p:cBhvr>
+                                        <p:cTn id="9" dur="1" fill="hold">
+                                          <p:stCondLst>
+                                            <p:cond delay="499"/>
+                                          </p:stCondLst>
+                                        </p:cTn>
+                                        <p:tgtEl>
+                                          <p:spTgt spid="6"/>
+                                        </p:tgtEl>
+                                        <p:attrNameLst>
+                                          <p:attrName>style.visibility</p:attrName>
+                                        </p:attrNameLst>
+                                      </p:cBhvr>
+                                      <p:to>
+                                        <p:strVal val="hidden"/>
+                                      </p:to>
+                                    </p:set>
+                                  </p:childTnLst>
+                                </p:cTn>
+                              </p:par>
+                            </p:childTnLst>
+                          </p:cTn>
+                        </p:par>
+                      </p:childTnLst>
+                    </p:cTn>
+                  </p:par>
+                </p:childTnLst>
+              </p:cTn>
+              <p:prevCondLst>
+                <p:cond evt="onPrev" delay="0">
+                  <p:tgtEl>
+                    <p:sldTgt/>
+                  </p:tgtEl>
+                </p:cond>
+              </p:prevCondLst>
+              <p:nextCondLst>
+                <p:cond evt="onNext" delay="0">
+                  <p:tgtEl>
+                    <p:sldTgt/>
+                  </p:tgtEl>
+                </p:cond>
+              </p:nextCondLst>
+            </p:seq>
+          </p:childTnLst>
+        </p:cTn>
+      </p:par>
+    </p:tnLst>
+    <p:bldLst>
+      <p:bldP spid="6" grpId="0" animBg="1"/>
+    </p:bldLst>
+  </p:timing>
 </p:sld>
 </file>
 
@@ -8616,6 +10088,13 @@
       </p:transition>
     </mc:Fallback>
   </mc:AlternateContent>
+  <p:timing>
+    <p:tnLst>
+      <p:par>
+        <p:cTn id="1" dur="indefinite" restart="never" nodeType="tmRoot"/>
+      </p:par>
+    </p:tnLst>
+  </p:timing>
 </p:sld>
 </file>
 
@@ -12105,6 +13584,13 @@
       </p:transition>
     </mc:Fallback>
   </mc:AlternateContent>
+  <p:timing>
+    <p:tnLst>
+      <p:par>
+        <p:cTn id="1" dur="indefinite" restart="never" nodeType="tmRoot"/>
+      </p:par>
+    </p:tnLst>
+  </p:timing>
 </p:sld>
 </file>
 

</xml_diff>